<commit_message>
Herencia, Modificación ejercicio colecciones
</commit_message>
<xml_diff>
--- a/ProgramacionII_Clase_09-2018.pptx
+++ b/ProgramacionII_Clase_09-2018.pptx
@@ -5,7 +5,7 @@
     <p:sldMasterId id="2147483648" r:id="rId1"/>
   </p:sldMasterIdLst>
   <p:notesMasterIdLst>
-    <p:notesMasterId r:id="rId17"/>
+    <p:notesMasterId r:id="rId20"/>
   </p:notesMasterIdLst>
   <p:sldIdLst>
     <p:sldId id="256" r:id="rId2"/>
@@ -23,6 +23,9 @@
     <p:sldId id="268" r:id="rId14"/>
     <p:sldId id="269" r:id="rId15"/>
     <p:sldId id="270" r:id="rId16"/>
+    <p:sldId id="272" r:id="rId17"/>
+    <p:sldId id="273" r:id="rId18"/>
+    <p:sldId id="271" r:id="rId19"/>
   </p:sldIdLst>
   <p:sldSz cx="12192000" cy="6858000"/>
   <p:notesSz cx="6858000" cy="9144000"/>
@@ -121,6 +124,11 @@
       </a:defRPr>
     </a:lvl9pPr>
   </p:defaultTextStyle>
+  <p:extLst>
+    <p:ext uri="{EFAFB233-063F-42B5-8137-9DF3F51BA10A}">
+      <p15:sldGuideLst xmlns:p15="http://schemas.microsoft.com/office/powerpoint/2012/main"/>
+    </p:ext>
+  </p:extLst>
 </p:presentation>
 </file>
 
@@ -206,7 +214,7 @@
           <a:p>
             <a:fld id="{1267D875-2AAF-4D2E-99FA-1317089CB94B}" type="datetimeFigureOut">
               <a:rPr lang="es-AR" smtClean="0"/>
-              <a:t>10/09/2018</a:t>
+              <a:t>18/9/2018</a:t>
             </a:fld>
             <a:endParaRPr lang="es-AR"/>
           </a:p>
@@ -857,7 +865,7 @@
           <a:p>
             <a:fld id="{78ABE3C1-DBE1-495D-B57B-2849774B866A}" type="datetimeFigureOut">
               <a:rPr lang="en-US" dirty="0"/>
-              <a:t>9/10/2018</a:t>
+              <a:t>9/18/2018</a:t>
             </a:fld>
             <a:endParaRPr lang="en-US" dirty="0"/>
           </a:p>
@@ -1266,7 +1274,7 @@
           <a:p>
             <a:fld id="{446C117F-5CCF-4837-BE5F-2B92066CAFAF}" type="datetimeFigureOut">
               <a:rPr lang="en-US" dirty="0"/>
-              <a:t>9/10/2018</a:t>
+              <a:t>9/18/2018</a:t>
             </a:fld>
             <a:endParaRPr lang="en-US" dirty="0"/>
           </a:p>
@@ -1597,7 +1605,7 @@
           <a:p>
             <a:fld id="{84EB90BD-B6CE-46B7-997F-7313B992CCDC}" type="datetimeFigureOut">
               <a:rPr lang="en-US" dirty="0"/>
-              <a:t>9/10/2018</a:t>
+              <a:t>9/18/2018</a:t>
             </a:fld>
             <a:endParaRPr lang="en-US" dirty="0"/>
           </a:p>
@@ -1997,7 +2005,7 @@
           <a:p>
             <a:fld id="{CDB9D11F-B188-461D-B23F-39381795C052}" type="datetimeFigureOut">
               <a:rPr lang="en-US" dirty="0"/>
-              <a:t>9/10/2018</a:t>
+              <a:t>9/18/2018</a:t>
             </a:fld>
             <a:endParaRPr lang="en-US" dirty="0"/>
           </a:p>
@@ -2560,7 +2568,7 @@
           <a:p>
             <a:fld id="{52E6D8D9-55A2-4063-B0F3-121F44549695}" type="datetimeFigureOut">
               <a:rPr lang="en-US" dirty="0"/>
-              <a:t>9/10/2018</a:t>
+              <a:t>9/18/2018</a:t>
             </a:fld>
             <a:endParaRPr lang="en-US" dirty="0"/>
           </a:p>
@@ -3236,7 +3244,7 @@
           <a:p>
             <a:fld id="{D4B24536-994D-4021-A283-9F449C0DB509}" type="datetimeFigureOut">
               <a:rPr lang="en-US" dirty="0"/>
-              <a:t>9/10/2018</a:t>
+              <a:t>9/18/2018</a:t>
             </a:fld>
             <a:endParaRPr lang="en-US" dirty="0"/>
           </a:p>
@@ -4144,7 +4152,7 @@
           <a:p>
             <a:fld id="{3CBBBB78-C96F-47B7-AB17-D852CA960AC9}" type="datetimeFigureOut">
               <a:rPr lang="en-US" dirty="0"/>
-              <a:t>9/10/2018</a:t>
+              <a:t>9/18/2018</a:t>
             </a:fld>
             <a:endParaRPr lang="en-US" dirty="0"/>
           </a:p>
@@ -4452,7 +4460,7 @@
           <a:p>
             <a:fld id="{1FA3F48C-C7C6-4055-9F49-3777875E72AE}" type="datetimeFigureOut">
               <a:rPr lang="en-US" dirty="0"/>
-              <a:t>9/10/2018</a:t>
+              <a:t>9/18/2018</a:t>
             </a:fld>
             <a:endParaRPr lang="en-US" dirty="0"/>
           </a:p>
@@ -4711,7 +4719,7 @@
           <a:p>
             <a:fld id="{6178E61D-D431-422C-9764-11DAFE33AB63}" type="datetimeFigureOut">
               <a:rPr lang="en-US" dirty="0"/>
-              <a:t>9/10/2018</a:t>
+              <a:t>9/18/2018</a:t>
             </a:fld>
             <a:endParaRPr lang="en-US" dirty="0"/>
           </a:p>
@@ -5030,7 +5038,7 @@
           <a:p>
             <a:fld id="{12DE42F4-6EEF-4EF7-8ED4-2208F0F89A08}" type="datetimeFigureOut">
               <a:rPr lang="en-US" dirty="0"/>
-              <a:t>9/10/2018</a:t>
+              <a:t>9/18/2018</a:t>
             </a:fld>
             <a:endParaRPr lang="en-US" dirty="0"/>
           </a:p>
@@ -5414,7 +5422,7 @@
           <a:p>
             <a:fld id="{30578ACC-22D6-47C1-A373-4FD133E34F3C}" type="datetimeFigureOut">
               <a:rPr lang="en-US" dirty="0"/>
-              <a:t>9/10/2018</a:t>
+              <a:t>9/18/2018</a:t>
             </a:fld>
             <a:endParaRPr lang="en-US" dirty="0"/>
           </a:p>
@@ -5785,7 +5793,7 @@
           <a:p>
             <a:fld id="{4E5A6C69-6797-4E8A-BF37-F2C3751466E9}" type="datetimeFigureOut">
               <a:rPr lang="en-US" dirty="0"/>
-              <a:t>9/10/2018</a:t>
+              <a:t>9/18/2018</a:t>
             </a:fld>
             <a:endParaRPr lang="en-US" dirty="0"/>
           </a:p>
@@ -6286,7 +6294,7 @@
           <a:p>
             <a:fld id="{D82014A1-A632-4878-A0D3-F52BA7563730}" type="datetimeFigureOut">
               <a:rPr lang="en-US" dirty="0"/>
-              <a:t>9/10/2018</a:t>
+              <a:t>9/18/2018</a:t>
             </a:fld>
             <a:endParaRPr lang="en-US" dirty="0"/>
           </a:p>
@@ -6538,7 +6546,7 @@
           <a:p>
             <a:fld id="{CE99F462-093F-4566-844B-4C71F2739DA5}" type="datetimeFigureOut">
               <a:rPr lang="en-US" dirty="0"/>
-              <a:t>9/10/2018</a:t>
+              <a:t>9/18/2018</a:t>
             </a:fld>
             <a:endParaRPr lang="en-US" dirty="0"/>
           </a:p>
@@ -6696,7 +6704,7 @@
           <a:p>
             <a:fld id="{3D24A7AC-904D-4781-85BA-7D10C17ED021}" type="datetimeFigureOut">
               <a:rPr lang="en-US" dirty="0"/>
-              <a:t>9/10/2018</a:t>
+              <a:t>9/18/2018</a:t>
             </a:fld>
             <a:endParaRPr lang="en-US" dirty="0"/>
           </a:p>
@@ -7081,7 +7089,7 @@
           <a:p>
             <a:fld id="{E331444B-B92B-4E27-8C94-BB93EAF5CB18}" type="datetimeFigureOut">
               <a:rPr lang="en-US" dirty="0"/>
-              <a:t>9/10/2018</a:t>
+              <a:t>9/18/2018</a:t>
             </a:fld>
             <a:endParaRPr lang="en-US" dirty="0"/>
           </a:p>
@@ -7485,7 +7493,7 @@
           <a:p>
             <a:fld id="{363EFA5E-FA76-400D-B3DC-F0BA90E6D107}" type="datetimeFigureOut">
               <a:rPr lang="en-US" dirty="0"/>
-              <a:t>9/10/2018</a:t>
+              <a:t>9/18/2018</a:t>
             </a:fld>
             <a:endParaRPr lang="en-US" dirty="0"/>
           </a:p>
@@ -7724,7 +7732,7 @@
           <a:p>
             <a:fld id="{9D6E9DEC-419B-4CC5-A080-3B06BD5A8291}" type="datetimeFigureOut">
               <a:rPr lang="en-US" dirty="0"/>
-              <a:t>9/10/2018</a:t>
+              <a:t>9/18/2018</a:t>
             </a:fld>
             <a:endParaRPr lang="en-US" dirty="0"/>
           </a:p>
@@ -11388,6 +11396,351 @@
 </p:sld>
 </file>
 
+<file path=ppt/slides/slide16.xml><?xml version="1.0" encoding="utf-8"?>
+<p:sld xmlns:a="http://schemas.openxmlformats.org/drawingml/2006/main" xmlns:r="http://schemas.openxmlformats.org/officeDocument/2006/relationships" xmlns:p="http://schemas.openxmlformats.org/presentationml/2006/main">
+  <p:cSld>
+    <p:spTree>
+      <p:nvGrpSpPr>
+        <p:cNvPr id="1" name=""/>
+        <p:cNvGrpSpPr/>
+        <p:nvPr/>
+      </p:nvGrpSpPr>
+      <p:grpSpPr>
+        <a:xfrm>
+          <a:off x="0" y="0"/>
+          <a:ext cx="0" cy="0"/>
+          <a:chOff x="0" y="0"/>
+          <a:chExt cx="0" cy="0"/>
+        </a:xfrm>
+      </p:grpSpPr>
+      <p:sp>
+        <p:nvSpPr>
+          <p:cNvPr id="2" name="Título 1"/>
+          <p:cNvSpPr>
+            <a:spLocks noGrp="1"/>
+          </p:cNvSpPr>
+          <p:nvPr>
+            <p:ph type="title"/>
+          </p:nvPr>
+        </p:nvSpPr>
+        <p:spPr/>
+        <p:txBody>
+          <a:bodyPr/>
+          <a:lstStyle/>
+          <a:p>
+            <a:r>
+              <a:rPr lang="es-AR" dirty="0" smtClean="0"/>
+              <a:t>Resumen / Puntos Clave</a:t>
+            </a:r>
+            <a:endParaRPr lang="es-AR" dirty="0"/>
+          </a:p>
+        </p:txBody>
+      </p:sp>
+      <p:sp>
+        <p:nvSpPr>
+          <p:cNvPr id="4" name="Marcador de contenido 3"/>
+          <p:cNvSpPr>
+            <a:spLocks noGrp="1"/>
+          </p:cNvSpPr>
+          <p:nvPr>
+            <p:ph idx="1"/>
+          </p:nvPr>
+        </p:nvSpPr>
+        <p:spPr/>
+        <p:txBody>
+          <a:bodyPr>
+            <a:normAutofit/>
+          </a:bodyPr>
+          <a:lstStyle/>
+          <a:p>
+            <a:r>
+              <a:rPr lang="es-AR" dirty="0" smtClean="0"/>
+              <a:t>La herencia permite crear nuevas clases más especializadas a partir de otras ya existentes más generales. </a:t>
+            </a:r>
+          </a:p>
+          <a:p>
+            <a:r>
+              <a:rPr lang="es-AR" dirty="0" smtClean="0"/>
+              <a:t>Las clases derivadas son versiones especializadas de las clases base. (Son del tipo de la clase base). </a:t>
+            </a:r>
+          </a:p>
+          <a:p>
+            <a:r>
+              <a:rPr lang="es-AR" dirty="0" smtClean="0"/>
+              <a:t>En .NET sólo se admite HERENCIA SIMPLE (Sólo se puede heredar de una clase). </a:t>
+            </a:r>
+          </a:p>
+          <a:p>
+            <a:r>
+              <a:rPr lang="es-AR" dirty="0" smtClean="0"/>
+              <a:t>La herencia es </a:t>
+            </a:r>
+            <a:r>
+              <a:rPr lang="es-AR" u="sng" dirty="0" smtClean="0"/>
+              <a:t>transitiva</a:t>
+            </a:r>
+            <a:r>
+              <a:rPr lang="es-AR" dirty="0" smtClean="0"/>
+              <a:t>: Si C hereda de B, y B hereda de A, entonces C también hereda de A. </a:t>
+            </a:r>
+            <a:endParaRPr lang="es-AR" dirty="0"/>
+          </a:p>
+        </p:txBody>
+      </p:sp>
+    </p:spTree>
+    <p:extLst>
+      <p:ext uri="{BB962C8B-B14F-4D97-AF65-F5344CB8AC3E}">
+        <p14:creationId xmlns:p14="http://schemas.microsoft.com/office/powerpoint/2010/main" val="4056374159"/>
+      </p:ext>
+    </p:extLst>
+  </p:cSld>
+  <p:clrMapOvr>
+    <a:masterClrMapping/>
+  </p:clrMapOvr>
+  <p:timing>
+    <p:tnLst>
+      <p:par>
+        <p:cTn id="1" dur="indefinite" restart="never" nodeType="tmRoot"/>
+      </p:par>
+    </p:tnLst>
+  </p:timing>
+</p:sld>
+</file>
+
+<file path=ppt/slides/slide17.xml><?xml version="1.0" encoding="utf-8"?>
+<p:sld xmlns:a="http://schemas.openxmlformats.org/drawingml/2006/main" xmlns:r="http://schemas.openxmlformats.org/officeDocument/2006/relationships" xmlns:p="http://schemas.openxmlformats.org/presentationml/2006/main">
+  <p:cSld>
+    <p:spTree>
+      <p:nvGrpSpPr>
+        <p:cNvPr id="1" name=""/>
+        <p:cNvGrpSpPr/>
+        <p:nvPr/>
+      </p:nvGrpSpPr>
+      <p:grpSpPr>
+        <a:xfrm>
+          <a:off x="0" y="0"/>
+          <a:ext cx="0" cy="0"/>
+          <a:chOff x="0" y="0"/>
+          <a:chExt cx="0" cy="0"/>
+        </a:xfrm>
+      </p:grpSpPr>
+      <p:sp>
+        <p:nvSpPr>
+          <p:cNvPr id="2" name="Título 1"/>
+          <p:cNvSpPr>
+            <a:spLocks noGrp="1"/>
+          </p:cNvSpPr>
+          <p:nvPr>
+            <p:ph type="title"/>
+          </p:nvPr>
+        </p:nvSpPr>
+        <p:spPr/>
+        <p:txBody>
+          <a:bodyPr/>
+          <a:lstStyle/>
+          <a:p>
+            <a:r>
+              <a:rPr lang="es-AR" dirty="0" smtClean="0"/>
+              <a:t>Resumen / Puntos Clave</a:t>
+            </a:r>
+            <a:endParaRPr lang="es-AR" dirty="0"/>
+          </a:p>
+        </p:txBody>
+      </p:sp>
+      <p:sp>
+        <p:nvSpPr>
+          <p:cNvPr id="4" name="Marcador de contenido 3"/>
+          <p:cNvSpPr>
+            <a:spLocks noGrp="1"/>
+          </p:cNvSpPr>
+          <p:nvPr>
+            <p:ph idx="1"/>
+          </p:nvPr>
+        </p:nvSpPr>
+        <p:spPr/>
+        <p:txBody>
+          <a:bodyPr>
+            <a:normAutofit fontScale="92500" lnSpcReduction="10000"/>
+          </a:bodyPr>
+          <a:lstStyle/>
+          <a:p>
+            <a:r>
+              <a:rPr lang="es-AR" dirty="0" smtClean="0"/>
+              <a:t>Se hereda TODO menos los constructores y finalizadores. </a:t>
+            </a:r>
+          </a:p>
+          <a:p>
+            <a:r>
+              <a:rPr lang="es-AR" dirty="0" smtClean="0"/>
+              <a:t>Los miembros </a:t>
+            </a:r>
+            <a:r>
+              <a:rPr lang="es-AR" b="1" dirty="0" err="1" smtClean="0"/>
+              <a:t>private</a:t>
+            </a:r>
+            <a:r>
+              <a:rPr lang="es-AR" dirty="0" smtClean="0"/>
+              <a:t> no son visibles en las clases derivadas (PERO SÍ SE HEREDAN). </a:t>
+            </a:r>
+          </a:p>
+          <a:p>
+            <a:r>
+              <a:rPr lang="es-AR" dirty="0" smtClean="0"/>
+              <a:t>Los miembros </a:t>
+            </a:r>
+            <a:r>
+              <a:rPr lang="es-AR" b="1" dirty="0" err="1" smtClean="0"/>
+              <a:t>protected</a:t>
+            </a:r>
+            <a:r>
+              <a:rPr lang="es-AR" dirty="0" smtClean="0"/>
+              <a:t> son accesibles desde todas las clases derivadas directa o indirectamente de la clase base, pero no desde otras clases que no hereden de ella. </a:t>
+            </a:r>
+          </a:p>
+          <a:p>
+            <a:r>
+              <a:rPr lang="es-AR" dirty="0" smtClean="0"/>
+              <a:t>Una clase derivada no puede ser más accesible que su clase base.</a:t>
+            </a:r>
+          </a:p>
+          <a:p>
+            <a:r>
+              <a:rPr lang="es-AR" dirty="0"/>
+              <a:t>Si no se realiza una llamada explícita a un constructor de clase </a:t>
+            </a:r>
+            <a:r>
+              <a:rPr lang="es-AR" dirty="0" smtClean="0"/>
+              <a:t>base </a:t>
+            </a:r>
+            <a:r>
+              <a:rPr lang="es-AR" dirty="0"/>
+              <a:t> </a:t>
+            </a:r>
+            <a:br>
+              <a:rPr lang="es-AR" dirty="0"/>
+            </a:br>
+            <a:r>
+              <a:rPr lang="es-AR" dirty="0" smtClean="0"/>
+              <a:t>[:base() ], </a:t>
+            </a:r>
+            <a:r>
+              <a:rPr lang="es-AR" dirty="0"/>
+              <a:t>el compilador de C# proporciona automáticamente una llamada al constructor sin parámetros o predeterminado de la clase base. </a:t>
+            </a:r>
+            <a:r>
+              <a:rPr lang="es-AR" dirty="0" smtClean="0"/>
+              <a:t> </a:t>
+            </a:r>
+            <a:endParaRPr lang="es-AR" dirty="0"/>
+          </a:p>
+        </p:txBody>
+      </p:sp>
+    </p:spTree>
+    <p:extLst>
+      <p:ext uri="{BB962C8B-B14F-4D97-AF65-F5344CB8AC3E}">
+        <p14:creationId xmlns:p14="http://schemas.microsoft.com/office/powerpoint/2010/main" val="568637991"/>
+      </p:ext>
+    </p:extLst>
+  </p:cSld>
+  <p:clrMapOvr>
+    <a:masterClrMapping/>
+  </p:clrMapOvr>
+  <p:timing>
+    <p:tnLst>
+      <p:par>
+        <p:cTn id="1" dur="indefinite" restart="never" nodeType="tmRoot"/>
+      </p:par>
+    </p:tnLst>
+  </p:timing>
+</p:sld>
+</file>
+
+<file path=ppt/slides/slide18.xml><?xml version="1.0" encoding="utf-8"?>
+<p:sld xmlns:a="http://schemas.openxmlformats.org/drawingml/2006/main" xmlns:r="http://schemas.openxmlformats.org/officeDocument/2006/relationships" xmlns:p="http://schemas.openxmlformats.org/presentationml/2006/main">
+  <p:cSld>
+    <p:spTree>
+      <p:nvGrpSpPr>
+        <p:cNvPr id="1" name=""/>
+        <p:cNvGrpSpPr/>
+        <p:nvPr/>
+      </p:nvGrpSpPr>
+      <p:grpSpPr>
+        <a:xfrm>
+          <a:off x="0" y="0"/>
+          <a:ext cx="0" cy="0"/>
+          <a:chOff x="0" y="0"/>
+          <a:chExt cx="0" cy="0"/>
+        </a:xfrm>
+      </p:grpSpPr>
+      <p:sp>
+        <p:nvSpPr>
+          <p:cNvPr id="2" name="Título 1"/>
+          <p:cNvSpPr>
+            <a:spLocks noGrp="1"/>
+          </p:cNvSpPr>
+          <p:nvPr>
+            <p:ph type="title"/>
+          </p:nvPr>
+        </p:nvSpPr>
+        <p:spPr/>
+        <p:txBody>
+          <a:bodyPr/>
+          <a:lstStyle/>
+          <a:p>
+            <a:r>
+              <a:rPr lang="es-AR" dirty="0" smtClean="0"/>
+              <a:t>Tipos de Clases y Herencia</a:t>
+            </a:r>
+            <a:endParaRPr lang="es-AR" dirty="0"/>
+          </a:p>
+        </p:txBody>
+      </p:sp>
+      <p:pic>
+        <p:nvPicPr>
+          <p:cNvPr id="6" name="Marcador de contenido 2"/>
+          <p:cNvPicPr>
+            <a:picLocks noGrp="1" noChangeAspect="1"/>
+          </p:cNvPicPr>
+          <p:nvPr>
+            <p:ph idx="1"/>
+          </p:nvPr>
+        </p:nvPicPr>
+        <p:blipFill>
+          <a:blip r:embed="rId2"/>
+          <a:stretch>
+            <a:fillRect/>
+          </a:stretch>
+        </p:blipFill>
+        <p:spPr>
+          <a:xfrm>
+            <a:off x="1169382" y="2892670"/>
+            <a:ext cx="9521454" cy="1944321"/>
+          </a:xfrm>
+          <a:prstGeom prst="rect">
+            <a:avLst/>
+          </a:prstGeom>
+        </p:spPr>
+      </p:pic>
+    </p:spTree>
+    <p:extLst>
+      <p:ext uri="{BB962C8B-B14F-4D97-AF65-F5344CB8AC3E}">
+        <p14:creationId xmlns:p14="http://schemas.microsoft.com/office/powerpoint/2010/main" val="2080110020"/>
+      </p:ext>
+    </p:extLst>
+  </p:cSld>
+  <p:clrMapOvr>
+    <a:masterClrMapping/>
+  </p:clrMapOvr>
+  <p:timing>
+    <p:tnLst>
+      <p:par>
+        <p:cTn id="1" dur="indefinite" restart="never" nodeType="tmRoot"/>
+      </p:par>
+    </p:tnLst>
+  </p:timing>
+</p:sld>
+</file>
+
 <file path=ppt/slides/slide2.xml><?xml version="1.0" encoding="utf-8"?>
 <p:sld xmlns:a="http://schemas.openxmlformats.org/drawingml/2006/main" xmlns:r="http://schemas.openxmlformats.org/officeDocument/2006/relationships" xmlns:p="http://schemas.openxmlformats.org/presentationml/2006/main">
   <p:cSld>
@@ -11589,7 +11942,13 @@
                 <a:tableStyleId>{5C22544A-7EE6-4342-B048-85BDC9FD1C3A}</a:tableStyleId>
               </a:tblPr>
               <a:tblGrid>
-                <a:gridCol w="3081020"/>
+                <a:gridCol w="3081020">
+                  <a:extLst>
+                    <a:ext uri="{9D8B030D-6E8A-4147-A177-3AD203B41FA5}">
+                      <a16:colId xmlns:a16="http://schemas.microsoft.com/office/drawing/2014/main" val="20000"/>
+                    </a:ext>
+                  </a:extLst>
+                </a:gridCol>
               </a:tblGrid>
               <a:tr h="370840">
                 <a:tc>
@@ -11606,6 +11965,11 @@
                   </a:txBody>
                   <a:tcPr/>
                 </a:tc>
+                <a:extLst>
+                  <a:ext uri="{0D108BD9-81ED-4DB2-BD59-A6C34878D82A}">
+                    <a16:rowId xmlns:a16="http://schemas.microsoft.com/office/drawing/2014/main" val="10000"/>
+                  </a:ext>
+                </a:extLst>
               </a:tr>
               <a:tr h="370840">
                 <a:tc>
@@ -11630,6 +11994,11 @@
                   </a:txBody>
                   <a:tcPr/>
                 </a:tc>
+                <a:extLst>
+                  <a:ext uri="{0D108BD9-81ED-4DB2-BD59-A6C34878D82A}">
+                    <a16:rowId xmlns:a16="http://schemas.microsoft.com/office/drawing/2014/main" val="10001"/>
+                  </a:ext>
+                </a:extLst>
               </a:tr>
               <a:tr h="370840">
                 <a:tc>
@@ -11654,6 +12023,11 @@
                   </a:txBody>
                   <a:tcPr/>
                 </a:tc>
+                <a:extLst>
+                  <a:ext uri="{0D108BD9-81ED-4DB2-BD59-A6C34878D82A}">
+                    <a16:rowId xmlns:a16="http://schemas.microsoft.com/office/drawing/2014/main" val="10002"/>
+                  </a:ext>
+                </a:extLst>
               </a:tr>
             </a:tbl>
           </a:graphicData>
@@ -11684,7 +12058,13 @@
                 <a:tableStyleId>{5C22544A-7EE6-4342-B048-85BDC9FD1C3A}</a:tableStyleId>
               </a:tblPr>
               <a:tblGrid>
-                <a:gridCol w="2038903"/>
+                <a:gridCol w="2038903">
+                  <a:extLst>
+                    <a:ext uri="{9D8B030D-6E8A-4147-A177-3AD203B41FA5}">
+                      <a16:colId xmlns:a16="http://schemas.microsoft.com/office/drawing/2014/main" val="20000"/>
+                    </a:ext>
+                  </a:extLst>
+                </a:gridCol>
               </a:tblGrid>
               <a:tr h="370840">
                 <a:tc>
@@ -11701,6 +12081,11 @@
                   </a:txBody>
                   <a:tcPr/>
                 </a:tc>
+                <a:extLst>
+                  <a:ext uri="{0D108BD9-81ED-4DB2-BD59-A6C34878D82A}">
+                    <a16:rowId xmlns:a16="http://schemas.microsoft.com/office/drawing/2014/main" val="10000"/>
+                  </a:ext>
+                </a:extLst>
               </a:tr>
               <a:tr h="370840">
                 <a:tc>
@@ -11725,6 +12110,11 @@
                   </a:txBody>
                   <a:tcPr/>
                 </a:tc>
+                <a:extLst>
+                  <a:ext uri="{0D108BD9-81ED-4DB2-BD59-A6C34878D82A}">
+                    <a16:rowId xmlns:a16="http://schemas.microsoft.com/office/drawing/2014/main" val="10001"/>
+                  </a:ext>
+                </a:extLst>
               </a:tr>
               <a:tr h="370840">
                 <a:tc>
@@ -11749,6 +12139,11 @@
                   </a:txBody>
                   <a:tcPr/>
                 </a:tc>
+                <a:extLst>
+                  <a:ext uri="{0D108BD9-81ED-4DB2-BD59-A6C34878D82A}">
+                    <a16:rowId xmlns:a16="http://schemas.microsoft.com/office/drawing/2014/main" val="10002"/>
+                  </a:ext>
+                </a:extLst>
               </a:tr>
             </a:tbl>
           </a:graphicData>
@@ -11779,7 +12174,13 @@
                 <a:tableStyleId>{5C22544A-7EE6-4342-B048-85BDC9FD1C3A}</a:tableStyleId>
               </a:tblPr>
               <a:tblGrid>
-                <a:gridCol w="2038903"/>
+                <a:gridCol w="2038903">
+                  <a:extLst>
+                    <a:ext uri="{9D8B030D-6E8A-4147-A177-3AD203B41FA5}">
+                      <a16:colId xmlns:a16="http://schemas.microsoft.com/office/drawing/2014/main" val="20000"/>
+                    </a:ext>
+                  </a:extLst>
+                </a:gridCol>
               </a:tblGrid>
               <a:tr h="370840">
                 <a:tc>
@@ -11796,6 +12197,11 @@
                   </a:txBody>
                   <a:tcPr/>
                 </a:tc>
+                <a:extLst>
+                  <a:ext uri="{0D108BD9-81ED-4DB2-BD59-A6C34878D82A}">
+                    <a16:rowId xmlns:a16="http://schemas.microsoft.com/office/drawing/2014/main" val="10000"/>
+                  </a:ext>
+                </a:extLst>
               </a:tr>
               <a:tr h="370840">
                 <a:tc>
@@ -11820,6 +12226,11 @@
                   </a:txBody>
                   <a:tcPr/>
                 </a:tc>
+                <a:extLst>
+                  <a:ext uri="{0D108BD9-81ED-4DB2-BD59-A6C34878D82A}">
+                    <a16:rowId xmlns:a16="http://schemas.microsoft.com/office/drawing/2014/main" val="10001"/>
+                  </a:ext>
+                </a:extLst>
               </a:tr>
               <a:tr h="370840">
                 <a:tc>
@@ -11844,6 +12255,11 @@
                   </a:txBody>
                   <a:tcPr/>
                 </a:tc>
+                <a:extLst>
+                  <a:ext uri="{0D108BD9-81ED-4DB2-BD59-A6C34878D82A}">
+                    <a16:rowId xmlns:a16="http://schemas.microsoft.com/office/drawing/2014/main" val="10002"/>
+                  </a:ext>
+                </a:extLst>
               </a:tr>
             </a:tbl>
           </a:graphicData>

</xml_diff>